<commit_message>
Added Colour, More logos
Added some colour, and more instances of our logo.
</commit_message>
<xml_diff>
--- a/Test/Presentations/Iteration 3.pptx
+++ b/Test/Presentations/Iteration 3.pptx
@@ -210,7 +210,7 @@
           <a:p>
             <a:fld id="{2C7CE36A-6537-48C9-86A7-C5BB40560095}" type="datetimeFigureOut">
               <a:rPr lang="en-US" smtClean="0"/>
-              <a:t>18-Nov-15</a:t>
+              <a:t>18/11/2015</a:t>
             </a:fld>
             <a:endParaRPr lang="en-US"/>
           </a:p>
@@ -4707,16 +4707,16 @@
           <a:lstStyle/>
           <a:p>
             <a:r>
-              <a:rPr lang="en-US" dirty="0" smtClean="0">
-                <a:solidFill>
-                  <a:schemeClr val="bg1"/>
+              <a:rPr lang="en-US" b="1" dirty="0" smtClean="0">
+                <a:solidFill>
+                  <a:srgbClr val="008AD3"/>
                 </a:solidFill>
               </a:rPr>
               <a:t>How it works</a:t>
             </a:r>
-            <a:endParaRPr lang="en-US" dirty="0">
+            <a:endParaRPr lang="en-US" b="1" dirty="0">
               <a:solidFill>
-                <a:schemeClr val="bg1"/>
+                <a:srgbClr val="008AD3"/>
               </a:solidFill>
             </a:endParaRPr>
           </a:p>
@@ -4742,6 +4742,11 @@
           <a:bodyPr/>
           <a:lstStyle/>
           <a:p>
+            <a:pPr>
+              <a:buClr>
+                <a:srgbClr val="91D7EC"/>
+              </a:buClr>
+            </a:pPr>
             <a:endParaRPr lang="en-NZ" b="1" dirty="0" smtClean="0">
               <a:solidFill>
                 <a:schemeClr val="bg1"/>
@@ -4749,6 +4754,11 @@
             </a:endParaRPr>
           </a:p>
           <a:p>
+            <a:pPr>
+              <a:buClr>
+                <a:srgbClr val="91D7EC"/>
+              </a:buClr>
+            </a:pPr>
             <a:r>
               <a:rPr lang="en-NZ" b="1" dirty="0" smtClean="0">
                 <a:solidFill>
@@ -4759,7 +4769,11 @@
             </a:r>
           </a:p>
           <a:p>
-            <a:pPr lvl="1"/>
+            <a:pPr lvl="1">
+              <a:buClr>
+                <a:srgbClr val="91D7EC"/>
+              </a:buClr>
+            </a:pPr>
             <a:r>
               <a:rPr lang="en-NZ" dirty="0" smtClean="0">
                 <a:solidFill>
@@ -4770,7 +4784,11 @@
             </a:r>
           </a:p>
           <a:p>
-            <a:pPr lvl="1"/>
+            <a:pPr lvl="1">
+              <a:buClr>
+                <a:srgbClr val="91D7EC"/>
+              </a:buClr>
+            </a:pPr>
             <a:r>
               <a:rPr lang="en-NZ" dirty="0" smtClean="0">
                 <a:solidFill>
@@ -4781,7 +4799,11 @@
             </a:r>
           </a:p>
           <a:p>
-            <a:pPr lvl="1"/>
+            <a:pPr lvl="1">
+              <a:buClr>
+                <a:srgbClr val="91D7EC"/>
+              </a:buClr>
+            </a:pPr>
             <a:r>
               <a:rPr lang="en-NZ" dirty="0" smtClean="0">
                 <a:solidFill>
@@ -4798,6 +4820,36 @@
           </a:p>
         </p:txBody>
       </p:sp>
+      <p:pic>
+        <p:nvPicPr>
+          <p:cNvPr id="4" name="Picture 3"/>
+          <p:cNvPicPr>
+            <a:picLocks noChangeAspect="1"/>
+          </p:cNvPicPr>
+          <p:nvPr/>
+        </p:nvPicPr>
+        <p:blipFill>
+          <a:blip r:embed="rId3">
+            <a:extLst>
+              <a:ext uri="{28A0092B-C50C-407E-A947-70E740481C1C}">
+                <a14:useLocalDpi xmlns:a14="http://schemas.microsoft.com/office/drawing/2010/main" val="0"/>
+              </a:ext>
+            </a:extLst>
+          </a:blip>
+          <a:stretch>
+            <a:fillRect/>
+          </a:stretch>
+        </p:blipFill>
+        <p:spPr>
+          <a:xfrm>
+            <a:off x="4048396" y="4541816"/>
+            <a:ext cx="5095604" cy="2316184"/>
+          </a:xfrm>
+          <a:prstGeom prst="rect">
+            <a:avLst/>
+          </a:prstGeom>
+        </p:spPr>
+      </p:pic>
     </p:spTree>
     <p:extLst>
       <p:ext uri="{BB962C8B-B14F-4D97-AF65-F5344CB8AC3E}">
@@ -4844,16 +4896,16 @@
           <a:lstStyle/>
           <a:p>
             <a:r>
-              <a:rPr lang="en-US" dirty="0" smtClean="0">
-                <a:solidFill>
-                  <a:schemeClr val="bg1"/>
+              <a:rPr lang="en-US" b="1" dirty="0" smtClean="0">
+                <a:solidFill>
+                  <a:srgbClr val="008AD3"/>
                 </a:solidFill>
               </a:rPr>
               <a:t>How it works</a:t>
             </a:r>
-            <a:endParaRPr lang="en-US" dirty="0">
+            <a:endParaRPr lang="en-US" b="1" dirty="0">
               <a:solidFill>
-                <a:schemeClr val="bg1"/>
+                <a:srgbClr val="008AD3"/>
               </a:solidFill>
             </a:endParaRPr>
           </a:p>
@@ -4874,6 +4926,11 @@
           <a:bodyPr/>
           <a:lstStyle/>
           <a:p>
+            <a:pPr>
+              <a:buClr>
+                <a:srgbClr val="91D7EC"/>
+              </a:buClr>
+            </a:pPr>
             <a:endParaRPr lang="en-NZ" b="1" dirty="0" smtClean="0">
               <a:solidFill>
                 <a:schemeClr val="bg1"/>
@@ -4881,6 +4938,11 @@
             </a:endParaRPr>
           </a:p>
           <a:p>
+            <a:pPr>
+              <a:buClr>
+                <a:srgbClr val="91D7EC"/>
+              </a:buClr>
+            </a:pPr>
             <a:r>
               <a:rPr lang="en-NZ" b="1" dirty="0" smtClean="0">
                 <a:solidFill>
@@ -4896,7 +4958,11 @@
             </a:endParaRPr>
           </a:p>
           <a:p>
-            <a:pPr lvl="1"/>
+            <a:pPr lvl="1">
+              <a:buClr>
+                <a:srgbClr val="91D7EC"/>
+              </a:buClr>
+            </a:pPr>
             <a:r>
               <a:rPr lang="en-NZ" dirty="0">
                 <a:solidFill>
@@ -4915,7 +4981,11 @@
             </a:r>
           </a:p>
           <a:p>
-            <a:pPr lvl="1"/>
+            <a:pPr lvl="1">
+              <a:buClr>
+                <a:srgbClr val="91D7EC"/>
+              </a:buClr>
+            </a:pPr>
             <a:r>
               <a:rPr lang="en-NZ" dirty="0" err="1" smtClean="0">
                 <a:solidFill>
@@ -4931,7 +5001,11 @@
             </a:endParaRPr>
           </a:p>
           <a:p>
-            <a:pPr lvl="1"/>
+            <a:pPr lvl="1">
+              <a:buClr>
+                <a:srgbClr val="91D7EC"/>
+              </a:buClr>
+            </a:pPr>
             <a:r>
               <a:rPr lang="en-NZ" dirty="0" smtClean="0">
                 <a:solidFill>
@@ -4958,7 +5032,11 @@
             </a:r>
           </a:p>
           <a:p>
-            <a:pPr lvl="1"/>
+            <a:pPr lvl="1">
+              <a:buClr>
+                <a:srgbClr val="91D7EC"/>
+              </a:buClr>
+            </a:pPr>
             <a:r>
               <a:rPr lang="en-NZ" dirty="0" smtClean="0">
                 <a:solidFill>
@@ -4974,10 +5052,45 @@
             </a:endParaRPr>
           </a:p>
           <a:p>
+            <a:pPr>
+              <a:buClr>
+                <a:srgbClr val="91D7EC"/>
+              </a:buClr>
+            </a:pPr>
             <a:endParaRPr lang="en-US" dirty="0"/>
           </a:p>
         </p:txBody>
       </p:sp>
+      <p:pic>
+        <p:nvPicPr>
+          <p:cNvPr id="4" name="Picture 3"/>
+          <p:cNvPicPr>
+            <a:picLocks noChangeAspect="1"/>
+          </p:cNvPicPr>
+          <p:nvPr/>
+        </p:nvPicPr>
+        <p:blipFill>
+          <a:blip r:embed="rId3">
+            <a:extLst>
+              <a:ext uri="{28A0092B-C50C-407E-A947-70E740481C1C}">
+                <a14:useLocalDpi xmlns:a14="http://schemas.microsoft.com/office/drawing/2010/main" val="0"/>
+              </a:ext>
+            </a:extLst>
+          </a:blip>
+          <a:stretch>
+            <a:fillRect/>
+          </a:stretch>
+        </p:blipFill>
+        <p:spPr>
+          <a:xfrm>
+            <a:off x="4048396" y="4541816"/>
+            <a:ext cx="5095604" cy="2316184"/>
+          </a:xfrm>
+          <a:prstGeom prst="rect">
+            <a:avLst/>
+          </a:prstGeom>
+        </p:spPr>
+      </p:pic>
     </p:spTree>
     <p:extLst>
       <p:ext uri="{BB962C8B-B14F-4D97-AF65-F5344CB8AC3E}">
@@ -5024,16 +5137,16 @@
           <a:lstStyle/>
           <a:p>
             <a:r>
-              <a:rPr lang="en-US" dirty="0" smtClean="0">
-                <a:solidFill>
-                  <a:schemeClr val="bg1"/>
+              <a:rPr lang="en-US" b="1" dirty="0" smtClean="0">
+                <a:solidFill>
+                  <a:srgbClr val="008AD3"/>
                 </a:solidFill>
               </a:rPr>
               <a:t>Google Maps API</a:t>
             </a:r>
-            <a:endParaRPr lang="en-US" dirty="0">
+            <a:endParaRPr lang="en-US" b="1" dirty="0">
               <a:solidFill>
-                <a:schemeClr val="bg1"/>
+                <a:srgbClr val="008AD3"/>
               </a:solidFill>
             </a:endParaRPr>
           </a:p>
@@ -5054,6 +5167,11 @@
           <a:bodyPr/>
           <a:lstStyle/>
           <a:p>
+            <a:pPr>
+              <a:buClr>
+                <a:srgbClr val="91D7EC"/>
+              </a:buClr>
+            </a:pPr>
             <a:r>
               <a:rPr lang="en-US" dirty="0" smtClean="0">
                 <a:solidFill>
@@ -5080,6 +5198,11 @@
             </a:r>
           </a:p>
           <a:p>
+            <a:pPr>
+              <a:buClr>
+                <a:srgbClr val="91D7EC"/>
+              </a:buClr>
+            </a:pPr>
             <a:endParaRPr lang="en-US" dirty="0">
               <a:solidFill>
                 <a:schemeClr val="bg1"/>
@@ -5164,16 +5287,16 @@
           <a:lstStyle/>
           <a:p>
             <a:r>
-              <a:rPr lang="en-US" dirty="0" smtClean="0">
-                <a:solidFill>
-                  <a:schemeClr val="bg1"/>
+              <a:rPr lang="en-US" b="1" dirty="0" smtClean="0">
+                <a:solidFill>
+                  <a:srgbClr val="008AD3"/>
                 </a:solidFill>
               </a:rPr>
               <a:t>Google Maps API</a:t>
             </a:r>
-            <a:endParaRPr lang="en-US" dirty="0">
+            <a:endParaRPr lang="en-US" b="1" dirty="0">
               <a:solidFill>
-                <a:schemeClr val="bg1"/>
+                <a:srgbClr val="008AD3"/>
               </a:solidFill>
             </a:endParaRPr>
           </a:p>
@@ -5194,6 +5317,11 @@
           <a:bodyPr/>
           <a:lstStyle/>
           <a:p>
+            <a:pPr>
+              <a:buClr>
+                <a:srgbClr val="91D7EC"/>
+              </a:buClr>
+            </a:pPr>
             <a:r>
               <a:rPr lang="en-US" dirty="0" smtClean="0">
                 <a:solidFill>
@@ -5294,40 +5422,51 @@
           <a:lstStyle/>
           <a:p>
             <a:r>
-              <a:rPr lang="en-US" dirty="0" smtClean="0">
-                <a:solidFill>
-                  <a:schemeClr val="bg1"/>
+              <a:rPr lang="en-US" b="1" dirty="0" smtClean="0">
+                <a:solidFill>
+                  <a:srgbClr val="008AD3"/>
                 </a:solidFill>
               </a:rPr>
               <a:t>Questions?</a:t>
             </a:r>
-            <a:endParaRPr lang="en-US" dirty="0">
+            <a:endParaRPr lang="en-US" b="1" dirty="0">
               <a:solidFill>
-                <a:schemeClr val="bg1"/>
+                <a:srgbClr val="008AD3"/>
               </a:solidFill>
             </a:endParaRPr>
           </a:p>
         </p:txBody>
       </p:sp>
-      <p:sp>
-        <p:nvSpPr>
-          <p:cNvPr id="3" name="Content Placeholder 2"/>
-          <p:cNvSpPr>
-            <a:spLocks noGrp="1"/>
-          </p:cNvSpPr>
-          <p:nvPr>
-            <p:ph idx="1"/>
-          </p:nvPr>
-        </p:nvSpPr>
-        <p:spPr/>
-        <p:txBody>
-          <a:bodyPr/>
-          <a:lstStyle/>
-          <a:p>
-            <a:endParaRPr lang="en-US"/>
-          </a:p>
-        </p:txBody>
-      </p:sp>
+      <p:pic>
+        <p:nvPicPr>
+          <p:cNvPr id="5" name="Picture 4"/>
+          <p:cNvPicPr>
+            <a:picLocks noChangeAspect="1"/>
+          </p:cNvPicPr>
+          <p:nvPr/>
+        </p:nvPicPr>
+        <p:blipFill>
+          <a:blip r:embed="rId2">
+            <a:extLst>
+              <a:ext uri="{28A0092B-C50C-407E-A947-70E740481C1C}">
+                <a14:useLocalDpi xmlns:a14="http://schemas.microsoft.com/office/drawing/2010/main" val="0"/>
+              </a:ext>
+            </a:extLst>
+          </a:blip>
+          <a:stretch>
+            <a:fillRect/>
+          </a:stretch>
+        </p:blipFill>
+        <p:spPr>
+          <a:xfrm>
+            <a:off x="628650" y="1690689"/>
+            <a:ext cx="7859222" cy="3572374"/>
+          </a:xfrm>
+          <a:prstGeom prst="rect">
+            <a:avLst/>
+          </a:prstGeom>
+        </p:spPr>
+      </p:pic>
     </p:spTree>
     <p:extLst>
       <p:ext uri="{BB962C8B-B14F-4D97-AF65-F5344CB8AC3E}">
@@ -5374,12 +5513,145 @@
           <a:lstStyle/>
           <a:p>
             <a:r>
-              <a:rPr lang="en-NZ" dirty="0" smtClean="0">
-                <a:solidFill>
-                  <a:schemeClr val="bg1"/>
+              <a:rPr lang="en-NZ" b="1" dirty="0" smtClean="0">
+                <a:solidFill>
+                  <a:srgbClr val="008AD3"/>
                 </a:solidFill>
               </a:rPr>
               <a:t>Overview</a:t>
+            </a:r>
+            <a:endParaRPr lang="en-NZ" b="1" dirty="0">
+              <a:solidFill>
+                <a:srgbClr val="008AD3"/>
+              </a:solidFill>
+            </a:endParaRPr>
+          </a:p>
+        </p:txBody>
+      </p:sp>
+      <p:sp>
+        <p:nvSpPr>
+          <p:cNvPr id="3" name="Content Placeholder 2"/>
+          <p:cNvSpPr>
+            <a:spLocks noGrp="1"/>
+          </p:cNvSpPr>
+          <p:nvPr>
+            <p:ph idx="1"/>
+          </p:nvPr>
+        </p:nvSpPr>
+        <p:spPr/>
+        <p:txBody>
+          <a:bodyPr/>
+          <a:lstStyle/>
+          <a:p>
+            <a:endParaRPr lang="en-NZ" dirty="0" smtClean="0">
+              <a:solidFill>
+                <a:srgbClr val="91D7EC"/>
+              </a:solidFill>
+            </a:endParaRPr>
+          </a:p>
+          <a:p>
+            <a:pPr>
+              <a:buClr>
+                <a:srgbClr val="91D7EC"/>
+              </a:buClr>
+            </a:pPr>
+            <a:r>
+              <a:rPr lang="en-NZ" dirty="0" smtClean="0">
+                <a:solidFill>
+                  <a:schemeClr val="bg1"/>
+                </a:solidFill>
+              </a:rPr>
+              <a:t>Project Description</a:t>
+            </a:r>
+          </a:p>
+          <a:p>
+            <a:pPr>
+              <a:buClr>
+                <a:srgbClr val="91D7EC"/>
+              </a:buClr>
+            </a:pPr>
+            <a:r>
+              <a:rPr lang="en-NZ" dirty="0" smtClean="0">
+                <a:solidFill>
+                  <a:schemeClr val="bg1"/>
+                </a:solidFill>
+              </a:rPr>
+              <a:t>What went right</a:t>
+            </a:r>
+          </a:p>
+          <a:p>
+            <a:pPr>
+              <a:buClr>
+                <a:srgbClr val="91D7EC"/>
+              </a:buClr>
+            </a:pPr>
+            <a:r>
+              <a:rPr lang="en-NZ" dirty="0" smtClean="0">
+                <a:solidFill>
+                  <a:schemeClr val="bg1"/>
+                </a:solidFill>
+              </a:rPr>
+              <a:t>What went wrong</a:t>
+            </a:r>
+          </a:p>
+          <a:p>
+            <a:pPr>
+              <a:buClr>
+                <a:srgbClr val="91D7EC"/>
+              </a:buClr>
+            </a:pPr>
+            <a:r>
+              <a:rPr lang="en-NZ" dirty="0" smtClean="0">
+                <a:solidFill>
+                  <a:schemeClr val="bg1"/>
+                </a:solidFill>
+              </a:rPr>
+              <a:t>What we hoped the end product would be</a:t>
+            </a:r>
+          </a:p>
+          <a:p>
+            <a:pPr>
+              <a:buClr>
+                <a:srgbClr val="91D7EC"/>
+              </a:buClr>
+            </a:pPr>
+            <a:r>
+              <a:rPr lang="en-NZ" dirty="0" smtClean="0">
+                <a:solidFill>
+                  <a:schemeClr val="bg1"/>
+                </a:solidFill>
+              </a:rPr>
+              <a:t>What the end product actually looks like</a:t>
+            </a:r>
+          </a:p>
+          <a:p>
+            <a:pPr>
+              <a:buClr>
+                <a:srgbClr val="91D7EC"/>
+              </a:buClr>
+            </a:pPr>
+            <a:r>
+              <a:rPr lang="en-NZ" dirty="0" smtClean="0">
+                <a:solidFill>
+                  <a:schemeClr val="bg1"/>
+                </a:solidFill>
+              </a:rPr>
+              <a:t>Live demonstration</a:t>
+            </a:r>
+          </a:p>
+          <a:p>
+            <a:pPr>
+              <a:buClr>
+                <a:srgbClr val="91D7EC"/>
+              </a:buClr>
+            </a:pPr>
+            <a:r>
+              <a:rPr lang="en-NZ" dirty="0" smtClean="0">
+                <a:solidFill>
+                  <a:schemeClr val="bg1"/>
+                </a:solidFill>
+              </a:rPr>
+              <a:t>How it works</a:t>
             </a:r>
             <a:endParaRPr lang="en-NZ" dirty="0">
               <a:solidFill>
@@ -5389,112 +5661,36 @@
           </a:p>
         </p:txBody>
       </p:sp>
-      <p:sp>
-        <p:nvSpPr>
-          <p:cNvPr id="3" name="Content Placeholder 2"/>
-          <p:cNvSpPr>
-            <a:spLocks noGrp="1"/>
-          </p:cNvSpPr>
-          <p:nvPr>
-            <p:ph idx="1"/>
-          </p:nvPr>
-        </p:nvSpPr>
-        <p:spPr/>
-        <p:txBody>
-          <a:bodyPr/>
-          <a:lstStyle/>
-          <a:p>
-            <a:endParaRPr lang="en-NZ" dirty="0" smtClean="0">
-              <a:solidFill>
-                <a:schemeClr val="bg1"/>
-              </a:solidFill>
-            </a:endParaRPr>
-          </a:p>
-          <a:p>
-            <a:r>
-              <a:rPr lang="en-NZ" dirty="0" smtClean="0">
-                <a:solidFill>
-                  <a:schemeClr val="bg1"/>
-                </a:solidFill>
-              </a:rPr>
-              <a:t>Project </a:t>
-            </a:r>
-            <a:r>
-              <a:rPr lang="en-NZ" dirty="0" smtClean="0">
-                <a:solidFill>
-                  <a:schemeClr val="bg1"/>
-                </a:solidFill>
-              </a:rPr>
-              <a:t>Description</a:t>
-            </a:r>
-          </a:p>
-          <a:p>
-            <a:r>
-              <a:rPr lang="en-NZ" dirty="0" smtClean="0">
-                <a:solidFill>
-                  <a:schemeClr val="bg1"/>
-                </a:solidFill>
-              </a:rPr>
-              <a:t>What went right</a:t>
-            </a:r>
-          </a:p>
-          <a:p>
-            <a:r>
-              <a:rPr lang="en-NZ" dirty="0" smtClean="0">
-                <a:solidFill>
-                  <a:schemeClr val="bg1"/>
-                </a:solidFill>
-              </a:rPr>
-              <a:t>What went wrong</a:t>
-            </a:r>
-          </a:p>
-          <a:p>
-            <a:r>
-              <a:rPr lang="en-NZ" dirty="0" smtClean="0">
-                <a:solidFill>
-                  <a:schemeClr val="bg1"/>
-                </a:solidFill>
-              </a:rPr>
-              <a:t>What we hoped the end product would be</a:t>
-            </a:r>
-          </a:p>
-          <a:p>
-            <a:r>
-              <a:rPr lang="en-NZ" dirty="0" smtClean="0">
-                <a:solidFill>
-                  <a:schemeClr val="bg1"/>
-                </a:solidFill>
-              </a:rPr>
-              <a:t>What the end product actually looks like</a:t>
-            </a:r>
-          </a:p>
-          <a:p>
-            <a:r>
-              <a:rPr lang="en-NZ" dirty="0" smtClean="0">
-                <a:solidFill>
-                  <a:schemeClr val="bg1"/>
-                </a:solidFill>
-              </a:rPr>
-              <a:t>Live demonstration</a:t>
-            </a:r>
-          </a:p>
-          <a:p>
-            <a:r>
-              <a:rPr lang="en-NZ" dirty="0" smtClean="0">
-                <a:solidFill>
-                  <a:schemeClr val="bg1"/>
-                </a:solidFill>
-              </a:rPr>
-              <a:t>How it works</a:t>
-            </a:r>
-            <a:endParaRPr lang="en-NZ" dirty="0">
-              <a:solidFill>
-                <a:schemeClr val="bg1"/>
-              </a:solidFill>
-            </a:endParaRPr>
-          </a:p>
-        </p:txBody>
-      </p:sp>
+      <p:pic>
+        <p:nvPicPr>
+          <p:cNvPr id="4" name="Picture 3"/>
+          <p:cNvPicPr>
+            <a:picLocks noChangeAspect="1"/>
+          </p:cNvPicPr>
+          <p:nvPr/>
+        </p:nvPicPr>
+        <p:blipFill>
+          <a:blip r:embed="rId3">
+            <a:extLst>
+              <a:ext uri="{28A0092B-C50C-407E-A947-70E740481C1C}">
+                <a14:useLocalDpi xmlns:a14="http://schemas.microsoft.com/office/drawing/2010/main" val="0"/>
+              </a:ext>
+            </a:extLst>
+          </a:blip>
+          <a:stretch>
+            <a:fillRect/>
+          </a:stretch>
+        </p:blipFill>
+        <p:spPr>
+          <a:xfrm>
+            <a:off x="4048396" y="4541816"/>
+            <a:ext cx="5095604" cy="2316184"/>
+          </a:xfrm>
+          <a:prstGeom prst="rect">
+            <a:avLst/>
+          </a:prstGeom>
+        </p:spPr>
+      </p:pic>
     </p:spTree>
     <p:extLst>
       <p:ext uri="{BB962C8B-B14F-4D97-AF65-F5344CB8AC3E}">
@@ -5541,28 +5737,76 @@
           <a:lstStyle/>
           <a:p>
             <a:r>
-              <a:rPr lang="en-NZ" dirty="0" smtClean="0">
-                <a:solidFill>
-                  <a:schemeClr val="bg1"/>
+              <a:rPr lang="en-NZ" b="1" dirty="0" smtClean="0">
+                <a:solidFill>
+                  <a:srgbClr val="008AD3"/>
                 </a:solidFill>
               </a:rPr>
               <a:t>What is </a:t>
             </a:r>
             <a:r>
-              <a:rPr lang="en-NZ" dirty="0" err="1" smtClean="0">
-                <a:solidFill>
-                  <a:schemeClr val="bg1"/>
+              <a:rPr lang="en-NZ" b="1" dirty="0" err="1" smtClean="0">
+                <a:solidFill>
+                  <a:srgbClr val="008AD3"/>
                 </a:solidFill>
               </a:rPr>
               <a:t>SwimSafe</a:t>
             </a:r>
             <a:r>
-              <a:rPr lang="en-NZ" dirty="0" smtClean="0">
-                <a:solidFill>
-                  <a:schemeClr val="bg1"/>
+              <a:rPr lang="en-NZ" b="1" dirty="0" smtClean="0">
+                <a:solidFill>
+                  <a:srgbClr val="008AD3"/>
                 </a:solidFill>
               </a:rPr>
               <a:t>?</a:t>
+            </a:r>
+            <a:endParaRPr lang="en-NZ" b="1" dirty="0">
+              <a:solidFill>
+                <a:srgbClr val="008AD3"/>
+              </a:solidFill>
+            </a:endParaRPr>
+          </a:p>
+        </p:txBody>
+      </p:sp>
+      <p:sp>
+        <p:nvSpPr>
+          <p:cNvPr id="3" name="Content Placeholder 2"/>
+          <p:cNvSpPr>
+            <a:spLocks noGrp="1"/>
+          </p:cNvSpPr>
+          <p:nvPr>
+            <p:ph idx="1"/>
+          </p:nvPr>
+        </p:nvSpPr>
+        <p:spPr/>
+        <p:txBody>
+          <a:bodyPr/>
+          <a:lstStyle/>
+          <a:p>
+            <a:pPr>
+              <a:buClr>
+                <a:srgbClr val="91D7EC"/>
+              </a:buClr>
+            </a:pPr>
+            <a:endParaRPr lang="en-NZ" dirty="0" smtClean="0">
+              <a:solidFill>
+                <a:schemeClr val="bg1"/>
+              </a:solidFill>
+            </a:endParaRPr>
+          </a:p>
+          <a:p>
+            <a:pPr>
+              <a:buClr>
+                <a:srgbClr val="91D7EC"/>
+              </a:buClr>
+            </a:pPr>
+            <a:r>
+              <a:rPr lang="en-NZ" dirty="0" smtClean="0">
+                <a:solidFill>
+                  <a:schemeClr val="bg1"/>
+                </a:solidFill>
+              </a:rPr>
+              <a:t>Interactive map</a:t>
             </a:r>
             <a:endParaRPr lang="en-NZ" dirty="0">
               <a:solidFill>
@@ -5570,45 +5814,12 @@
               </a:solidFill>
             </a:endParaRPr>
           </a:p>
-        </p:txBody>
-      </p:sp>
-      <p:sp>
-        <p:nvSpPr>
-          <p:cNvPr id="3" name="Content Placeholder 2"/>
-          <p:cNvSpPr>
-            <a:spLocks noGrp="1"/>
-          </p:cNvSpPr>
-          <p:nvPr>
-            <p:ph idx="1"/>
-          </p:nvPr>
-        </p:nvSpPr>
-        <p:spPr/>
-        <p:txBody>
-          <a:bodyPr/>
-          <a:lstStyle/>
-          <a:p>
-            <a:endParaRPr lang="en-NZ" dirty="0" smtClean="0">
-              <a:solidFill>
-                <a:schemeClr val="bg1"/>
-              </a:solidFill>
-            </a:endParaRPr>
-          </a:p>
-          <a:p>
-            <a:r>
-              <a:rPr lang="en-NZ" dirty="0" smtClean="0">
-                <a:solidFill>
-                  <a:schemeClr val="bg1"/>
-                </a:solidFill>
-              </a:rPr>
-              <a:t>Interactive map</a:t>
-            </a:r>
-            <a:endParaRPr lang="en-NZ" dirty="0">
-              <a:solidFill>
-                <a:schemeClr val="bg1"/>
-              </a:solidFill>
-            </a:endParaRPr>
-          </a:p>
-          <a:p>
+          <a:p>
+            <a:pPr>
+              <a:buClr>
+                <a:srgbClr val="91D7EC"/>
+              </a:buClr>
+            </a:pPr>
             <a:r>
               <a:rPr lang="en-NZ" dirty="0" smtClean="0">
                 <a:solidFill>
@@ -5619,6 +5830,11 @@
             </a:r>
           </a:p>
           <a:p>
+            <a:pPr>
+              <a:buClr>
+                <a:srgbClr val="91D7EC"/>
+              </a:buClr>
+            </a:pPr>
             <a:r>
               <a:rPr lang="en-NZ" dirty="0" smtClean="0">
                 <a:solidFill>
@@ -5629,10 +5845,45 @@
             </a:r>
           </a:p>
           <a:p>
+            <a:pPr>
+              <a:buClr>
+                <a:srgbClr val="91D7EC"/>
+              </a:buClr>
+            </a:pPr>
             <a:endParaRPr lang="en-NZ" dirty="0" smtClean="0"/>
           </a:p>
         </p:txBody>
       </p:sp>
+      <p:pic>
+        <p:nvPicPr>
+          <p:cNvPr id="4" name="Picture 3"/>
+          <p:cNvPicPr>
+            <a:picLocks noChangeAspect="1"/>
+          </p:cNvPicPr>
+          <p:nvPr/>
+        </p:nvPicPr>
+        <p:blipFill>
+          <a:blip r:embed="rId3">
+            <a:extLst>
+              <a:ext uri="{28A0092B-C50C-407E-A947-70E740481C1C}">
+                <a14:useLocalDpi xmlns:a14="http://schemas.microsoft.com/office/drawing/2010/main" val="0"/>
+              </a:ext>
+            </a:extLst>
+          </a:blip>
+          <a:stretch>
+            <a:fillRect/>
+          </a:stretch>
+        </p:blipFill>
+        <p:spPr>
+          <a:xfrm>
+            <a:off x="4048396" y="4541816"/>
+            <a:ext cx="5095604" cy="2316184"/>
+          </a:xfrm>
+          <a:prstGeom prst="rect">
+            <a:avLst/>
+          </a:prstGeom>
+        </p:spPr>
+      </p:pic>
     </p:spTree>
     <p:extLst>
       <p:ext uri="{BB962C8B-B14F-4D97-AF65-F5344CB8AC3E}">
@@ -5679,12 +5930,105 @@
           <a:lstStyle/>
           <a:p>
             <a:r>
-              <a:rPr lang="en-NZ" dirty="0" smtClean="0">
-                <a:solidFill>
-                  <a:schemeClr val="bg1"/>
+              <a:rPr lang="en-NZ" b="1" dirty="0" smtClean="0">
+                <a:solidFill>
+                  <a:srgbClr val="008AD3"/>
                 </a:solidFill>
               </a:rPr>
               <a:t>What went right</a:t>
+            </a:r>
+            <a:endParaRPr lang="en-NZ" b="1" dirty="0">
+              <a:solidFill>
+                <a:srgbClr val="008AD3"/>
+              </a:solidFill>
+            </a:endParaRPr>
+          </a:p>
+        </p:txBody>
+      </p:sp>
+      <p:sp>
+        <p:nvSpPr>
+          <p:cNvPr id="3" name="Content Placeholder 2"/>
+          <p:cNvSpPr>
+            <a:spLocks noGrp="1"/>
+          </p:cNvSpPr>
+          <p:nvPr>
+            <p:ph idx="1"/>
+          </p:nvPr>
+        </p:nvSpPr>
+        <p:spPr/>
+        <p:txBody>
+          <a:bodyPr/>
+          <a:lstStyle/>
+          <a:p>
+            <a:pPr>
+              <a:buClr>
+                <a:srgbClr val="91D7EC"/>
+              </a:buClr>
+            </a:pPr>
+            <a:endParaRPr lang="en-NZ" dirty="0" smtClean="0">
+              <a:solidFill>
+                <a:schemeClr val="bg1"/>
+              </a:solidFill>
+            </a:endParaRPr>
+          </a:p>
+          <a:p>
+            <a:pPr>
+              <a:buClr>
+                <a:srgbClr val="91D7EC"/>
+              </a:buClr>
+            </a:pPr>
+            <a:r>
+              <a:rPr lang="en-NZ" dirty="0" smtClean="0">
+                <a:solidFill>
+                  <a:schemeClr val="bg1"/>
+                </a:solidFill>
+              </a:rPr>
+              <a:t>Google maps API</a:t>
+            </a:r>
+          </a:p>
+          <a:p>
+            <a:pPr>
+              <a:buClr>
+                <a:srgbClr val="91D7EC"/>
+              </a:buClr>
+            </a:pPr>
+            <a:r>
+              <a:rPr lang="en-NZ" dirty="0" smtClean="0">
+                <a:solidFill>
+                  <a:schemeClr val="bg1"/>
+                </a:solidFill>
+              </a:rPr>
+              <a:t>PHP</a:t>
+            </a:r>
+          </a:p>
+          <a:p>
+            <a:pPr>
+              <a:buClr>
+                <a:srgbClr val="91D7EC"/>
+              </a:buClr>
+            </a:pPr>
+            <a:r>
+              <a:rPr lang="en-NZ" dirty="0" smtClean="0">
+                <a:solidFill>
+                  <a:schemeClr val="bg1"/>
+                </a:solidFill>
+              </a:rPr>
+              <a:t>JavaScript</a:t>
+            </a:r>
+          </a:p>
+          <a:p>
+            <a:pPr>
+              <a:buClr>
+                <a:srgbClr val="91D7EC"/>
+              </a:buClr>
+            </a:pPr>
+            <a:r>
+              <a:rPr lang="en-NZ" dirty="0" smtClean="0">
+                <a:solidFill>
+                  <a:schemeClr val="bg1"/>
+                </a:solidFill>
+              </a:rPr>
+              <a:t>Database, server setup</a:t>
             </a:r>
             <a:endParaRPr lang="en-NZ" dirty="0">
               <a:solidFill>
@@ -5694,79 +6038,36 @@
           </a:p>
         </p:txBody>
       </p:sp>
-      <p:sp>
-        <p:nvSpPr>
-          <p:cNvPr id="3" name="Content Placeholder 2"/>
-          <p:cNvSpPr>
-            <a:spLocks noGrp="1"/>
-          </p:cNvSpPr>
-          <p:nvPr>
-            <p:ph idx="1"/>
-          </p:nvPr>
-        </p:nvSpPr>
-        <p:spPr/>
-        <p:txBody>
-          <a:bodyPr/>
-          <a:lstStyle/>
-          <a:p>
-            <a:endParaRPr lang="en-NZ" dirty="0" smtClean="0">
-              <a:solidFill>
-                <a:schemeClr val="bg1"/>
-              </a:solidFill>
-            </a:endParaRPr>
-          </a:p>
-          <a:p>
-            <a:r>
-              <a:rPr lang="en-NZ" dirty="0" smtClean="0">
-                <a:solidFill>
-                  <a:schemeClr val="bg1"/>
-                </a:solidFill>
-              </a:rPr>
-              <a:t>Google maps API</a:t>
-            </a:r>
-          </a:p>
-          <a:p>
-            <a:r>
-              <a:rPr lang="en-NZ" dirty="0" smtClean="0">
-                <a:solidFill>
-                  <a:schemeClr val="bg1"/>
-                </a:solidFill>
-              </a:rPr>
-              <a:t>PHP</a:t>
-            </a:r>
-          </a:p>
-          <a:p>
-            <a:r>
-              <a:rPr lang="en-NZ" dirty="0" smtClean="0">
-                <a:solidFill>
-                  <a:schemeClr val="bg1"/>
-                </a:solidFill>
-              </a:rPr>
-              <a:t>JavaScript</a:t>
-            </a:r>
-            <a:endParaRPr lang="en-NZ" dirty="0" smtClean="0">
-              <a:solidFill>
-                <a:schemeClr val="bg1"/>
-              </a:solidFill>
-            </a:endParaRPr>
-          </a:p>
-          <a:p>
-            <a:r>
-              <a:rPr lang="en-NZ" dirty="0" smtClean="0">
-                <a:solidFill>
-                  <a:schemeClr val="bg1"/>
-                </a:solidFill>
-              </a:rPr>
-              <a:t>Database, server setup</a:t>
-            </a:r>
-            <a:endParaRPr lang="en-NZ" dirty="0">
-              <a:solidFill>
-                <a:schemeClr val="bg1"/>
-              </a:solidFill>
-            </a:endParaRPr>
-          </a:p>
-        </p:txBody>
-      </p:sp>
+      <p:pic>
+        <p:nvPicPr>
+          <p:cNvPr id="4" name="Picture 3"/>
+          <p:cNvPicPr>
+            <a:picLocks noChangeAspect="1"/>
+          </p:cNvPicPr>
+          <p:nvPr/>
+        </p:nvPicPr>
+        <p:blipFill>
+          <a:blip r:embed="rId3">
+            <a:extLst>
+              <a:ext uri="{28A0092B-C50C-407E-A947-70E740481C1C}">
+                <a14:useLocalDpi xmlns:a14="http://schemas.microsoft.com/office/drawing/2010/main" val="0"/>
+              </a:ext>
+            </a:extLst>
+          </a:blip>
+          <a:stretch>
+            <a:fillRect/>
+          </a:stretch>
+        </p:blipFill>
+        <p:spPr>
+          <a:xfrm>
+            <a:off x="4048396" y="4541816"/>
+            <a:ext cx="5095604" cy="2316184"/>
+          </a:xfrm>
+          <a:prstGeom prst="rect">
+            <a:avLst/>
+          </a:prstGeom>
+        </p:spPr>
+      </p:pic>
     </p:spTree>
     <p:extLst>
       <p:ext uri="{BB962C8B-B14F-4D97-AF65-F5344CB8AC3E}">
@@ -5813,12 +6114,83 @@
           <a:lstStyle/>
           <a:p>
             <a:r>
-              <a:rPr lang="en-NZ" dirty="0" smtClean="0">
-                <a:solidFill>
-                  <a:schemeClr val="bg1"/>
+              <a:rPr lang="en-NZ" b="1" dirty="0" smtClean="0">
+                <a:solidFill>
+                  <a:srgbClr val="008AD3"/>
                 </a:solidFill>
               </a:rPr>
               <a:t>What went wrong</a:t>
+            </a:r>
+            <a:endParaRPr lang="en-NZ" b="1" dirty="0">
+              <a:solidFill>
+                <a:srgbClr val="008AD3"/>
+              </a:solidFill>
+            </a:endParaRPr>
+          </a:p>
+        </p:txBody>
+      </p:sp>
+      <p:sp>
+        <p:nvSpPr>
+          <p:cNvPr id="3" name="Content Placeholder 2"/>
+          <p:cNvSpPr>
+            <a:spLocks noGrp="1"/>
+          </p:cNvSpPr>
+          <p:nvPr>
+            <p:ph idx="1"/>
+          </p:nvPr>
+        </p:nvSpPr>
+        <p:spPr/>
+        <p:txBody>
+          <a:bodyPr/>
+          <a:lstStyle/>
+          <a:p>
+            <a:pPr>
+              <a:buClr>
+                <a:srgbClr val="91D7EC"/>
+              </a:buClr>
+            </a:pPr>
+            <a:endParaRPr lang="en-NZ" dirty="0" smtClean="0">
+              <a:solidFill>
+                <a:schemeClr val="bg1"/>
+              </a:solidFill>
+            </a:endParaRPr>
+          </a:p>
+          <a:p>
+            <a:pPr>
+              <a:buClr>
+                <a:srgbClr val="91D7EC"/>
+              </a:buClr>
+            </a:pPr>
+            <a:r>
+              <a:rPr lang="en-NZ" dirty="0" err="1" smtClean="0">
+                <a:solidFill>
+                  <a:schemeClr val="bg1"/>
+                </a:solidFill>
+              </a:rPr>
+              <a:t>InfoWindow</a:t>
+            </a:r>
+            <a:r>
+              <a:rPr lang="en-NZ" dirty="0" smtClean="0">
+                <a:solidFill>
+                  <a:schemeClr val="bg1"/>
+                </a:solidFill>
+              </a:rPr>
+              <a:t> styling</a:t>
+            </a:r>
+          </a:p>
+          <a:p>
+            <a:pPr>
+              <a:buClr>
+                <a:srgbClr val="91D7EC"/>
+              </a:buClr>
+            </a:pPr>
+            <a:r>
+              <a:rPr lang="en-NZ" dirty="0" smtClean="0">
+                <a:solidFill>
+                  <a:schemeClr val="bg1"/>
+                </a:solidFill>
+              </a:rPr>
+              <a:t>Acquiring live data</a:t>
             </a:r>
             <a:endParaRPr lang="en-NZ" dirty="0">
               <a:solidFill>
@@ -5828,67 +6200,36 @@
           </a:p>
         </p:txBody>
       </p:sp>
-      <p:sp>
-        <p:nvSpPr>
-          <p:cNvPr id="3" name="Content Placeholder 2"/>
-          <p:cNvSpPr>
-            <a:spLocks noGrp="1"/>
-          </p:cNvSpPr>
-          <p:nvPr>
-            <p:ph idx="1"/>
-          </p:nvPr>
-        </p:nvSpPr>
-        <p:spPr/>
-        <p:txBody>
-          <a:bodyPr/>
-          <a:lstStyle/>
-          <a:p>
-            <a:endParaRPr lang="en-NZ" dirty="0" smtClean="0">
-              <a:solidFill>
-                <a:schemeClr val="bg1"/>
-              </a:solidFill>
-            </a:endParaRPr>
-          </a:p>
-          <a:p>
-            <a:r>
-              <a:rPr lang="en-NZ" dirty="0" err="1" smtClean="0">
-                <a:solidFill>
-                  <a:schemeClr val="bg1"/>
-                </a:solidFill>
-              </a:rPr>
-              <a:t>InfoWindow</a:t>
-            </a:r>
-            <a:r>
-              <a:rPr lang="en-NZ" dirty="0" smtClean="0">
-                <a:solidFill>
-                  <a:schemeClr val="bg1"/>
-                </a:solidFill>
-              </a:rPr>
-              <a:t> styling</a:t>
-            </a:r>
-            <a:endParaRPr lang="en-NZ" dirty="0" smtClean="0">
-              <a:solidFill>
-                <a:schemeClr val="bg1"/>
-              </a:solidFill>
-            </a:endParaRPr>
-          </a:p>
-          <a:p>
-            <a:r>
-              <a:rPr lang="en-NZ" dirty="0" smtClean="0">
-                <a:solidFill>
-                  <a:schemeClr val="bg1"/>
-                </a:solidFill>
-              </a:rPr>
-              <a:t>Acquiring live data</a:t>
-            </a:r>
-            <a:endParaRPr lang="en-NZ" dirty="0">
-              <a:solidFill>
-                <a:schemeClr val="bg1"/>
-              </a:solidFill>
-            </a:endParaRPr>
-          </a:p>
-        </p:txBody>
-      </p:sp>
+      <p:pic>
+        <p:nvPicPr>
+          <p:cNvPr id="4" name="Picture 3"/>
+          <p:cNvPicPr>
+            <a:picLocks noChangeAspect="1"/>
+          </p:cNvPicPr>
+          <p:nvPr/>
+        </p:nvPicPr>
+        <p:blipFill>
+          <a:blip r:embed="rId3">
+            <a:extLst>
+              <a:ext uri="{28A0092B-C50C-407E-A947-70E740481C1C}">
+                <a14:useLocalDpi xmlns:a14="http://schemas.microsoft.com/office/drawing/2010/main" val="0"/>
+              </a:ext>
+            </a:extLst>
+          </a:blip>
+          <a:stretch>
+            <a:fillRect/>
+          </a:stretch>
+        </p:blipFill>
+        <p:spPr>
+          <a:xfrm>
+            <a:off x="4048396" y="4541816"/>
+            <a:ext cx="5095604" cy="2316184"/>
+          </a:xfrm>
+          <a:prstGeom prst="rect">
+            <a:avLst/>
+          </a:prstGeom>
+        </p:spPr>
+      </p:pic>
     </p:spTree>
     <p:extLst>
       <p:ext uri="{BB962C8B-B14F-4D97-AF65-F5344CB8AC3E}">
@@ -5937,12 +6278,78 @@
           <a:lstStyle/>
           <a:p>
             <a:r>
-              <a:rPr lang="en-NZ" dirty="0" smtClean="0">
-                <a:solidFill>
-                  <a:schemeClr val="bg1"/>
+              <a:rPr lang="en-NZ" b="1" dirty="0" smtClean="0">
+                <a:solidFill>
+                  <a:srgbClr val="008AD3"/>
                 </a:solidFill>
               </a:rPr>
               <a:t>What we hoped the product would be</a:t>
+            </a:r>
+            <a:endParaRPr lang="en-NZ" b="1" dirty="0">
+              <a:solidFill>
+                <a:srgbClr val="008AD3"/>
+              </a:solidFill>
+            </a:endParaRPr>
+          </a:p>
+        </p:txBody>
+      </p:sp>
+      <p:sp>
+        <p:nvSpPr>
+          <p:cNvPr id="3" name="Content Placeholder 2"/>
+          <p:cNvSpPr>
+            <a:spLocks noGrp="1"/>
+          </p:cNvSpPr>
+          <p:nvPr>
+            <p:ph idx="1"/>
+          </p:nvPr>
+        </p:nvSpPr>
+        <p:spPr/>
+        <p:txBody>
+          <a:bodyPr/>
+          <a:lstStyle/>
+          <a:p>
+            <a:pPr>
+              <a:buClr>
+                <a:srgbClr val="91D7EC"/>
+              </a:buClr>
+            </a:pPr>
+            <a:r>
+              <a:rPr lang="en-NZ" dirty="0" smtClean="0">
+                <a:solidFill>
+                  <a:schemeClr val="bg1"/>
+                </a:solidFill>
+              </a:rPr>
+              <a:t>Easy to use</a:t>
+            </a:r>
+          </a:p>
+          <a:p>
+            <a:pPr>
+              <a:buClr>
+                <a:srgbClr val="91D7EC"/>
+              </a:buClr>
+            </a:pPr>
+            <a:r>
+              <a:rPr lang="en-NZ" dirty="0" smtClean="0">
+                <a:solidFill>
+                  <a:schemeClr val="bg1"/>
+                </a:solidFill>
+              </a:rPr>
+              <a:t>Intuitive</a:t>
+            </a:r>
+          </a:p>
+          <a:p>
+            <a:pPr>
+              <a:buClr>
+                <a:srgbClr val="91D7EC"/>
+              </a:buClr>
+            </a:pPr>
+            <a:r>
+              <a:rPr lang="en-NZ" dirty="0" smtClean="0">
+                <a:solidFill>
+                  <a:schemeClr val="bg1"/>
+                </a:solidFill>
+              </a:rPr>
+              <a:t>Live data about swimming locations</a:t>
             </a:r>
             <a:endParaRPr lang="en-NZ" dirty="0">
               <a:solidFill>
@@ -5952,57 +6359,36 @@
           </a:p>
         </p:txBody>
       </p:sp>
-      <p:sp>
-        <p:nvSpPr>
-          <p:cNvPr id="3" name="Content Placeholder 2"/>
-          <p:cNvSpPr>
-            <a:spLocks noGrp="1"/>
-          </p:cNvSpPr>
-          <p:nvPr>
-            <p:ph idx="1"/>
-          </p:nvPr>
-        </p:nvSpPr>
-        <p:spPr/>
-        <p:txBody>
-          <a:bodyPr/>
-          <a:lstStyle/>
-          <a:p>
-            <a:r>
-              <a:rPr lang="en-NZ" dirty="0" smtClean="0">
-                <a:solidFill>
-                  <a:schemeClr val="bg1"/>
-                </a:solidFill>
-              </a:rPr>
-              <a:t>Easy to use</a:t>
-            </a:r>
-          </a:p>
-          <a:p>
-            <a:r>
-              <a:rPr lang="en-NZ" dirty="0" smtClean="0">
-                <a:solidFill>
-                  <a:schemeClr val="bg1"/>
-                </a:solidFill>
-              </a:rPr>
-              <a:t>Intuitive</a:t>
-            </a:r>
-          </a:p>
-          <a:p>
-            <a:r>
-              <a:rPr lang="en-NZ" dirty="0" smtClean="0">
-                <a:solidFill>
-                  <a:schemeClr val="bg1"/>
-                </a:solidFill>
-              </a:rPr>
-              <a:t>Live data about swimming locations</a:t>
-            </a:r>
-            <a:endParaRPr lang="en-NZ" dirty="0">
-              <a:solidFill>
-                <a:schemeClr val="bg1"/>
-              </a:solidFill>
-            </a:endParaRPr>
-          </a:p>
-        </p:txBody>
-      </p:sp>
+      <p:pic>
+        <p:nvPicPr>
+          <p:cNvPr id="4" name="Picture 3"/>
+          <p:cNvPicPr>
+            <a:picLocks noChangeAspect="1"/>
+          </p:cNvPicPr>
+          <p:nvPr/>
+        </p:nvPicPr>
+        <p:blipFill>
+          <a:blip r:embed="rId3">
+            <a:extLst>
+              <a:ext uri="{28A0092B-C50C-407E-A947-70E740481C1C}">
+                <a14:useLocalDpi xmlns:a14="http://schemas.microsoft.com/office/drawing/2010/main" val="0"/>
+              </a:ext>
+            </a:extLst>
+          </a:blip>
+          <a:stretch>
+            <a:fillRect/>
+          </a:stretch>
+        </p:blipFill>
+        <p:spPr>
+          <a:xfrm>
+            <a:off x="4048396" y="4541816"/>
+            <a:ext cx="5095604" cy="2316184"/>
+          </a:xfrm>
+          <a:prstGeom prst="rect">
+            <a:avLst/>
+          </a:prstGeom>
+        </p:spPr>
+      </p:pic>
     </p:spTree>
     <p:extLst>
       <p:ext uri="{BB962C8B-B14F-4D97-AF65-F5344CB8AC3E}">
@@ -6049,16 +6435,16 @@
           <a:lstStyle/>
           <a:p>
             <a:r>
-              <a:rPr lang="en-NZ" dirty="0" smtClean="0">
-                <a:solidFill>
-                  <a:schemeClr val="bg1"/>
+              <a:rPr lang="en-NZ" b="1" dirty="0" smtClean="0">
+                <a:solidFill>
+                  <a:srgbClr val="008AD3"/>
                 </a:solidFill>
               </a:rPr>
               <a:t>The end product</a:t>
             </a:r>
-            <a:endParaRPr lang="en-NZ" dirty="0">
+            <a:endParaRPr lang="en-NZ" b="1" dirty="0">
               <a:solidFill>
-                <a:schemeClr val="bg1"/>
+                <a:srgbClr val="008AD3"/>
               </a:solidFill>
             </a:endParaRPr>
           </a:p>
@@ -6080,6 +6466,9 @@
           <a:lstStyle/>
           <a:p>
             <a:pPr marL="0" indent="0">
+              <a:buClr>
+                <a:srgbClr val="91D7EC"/>
+              </a:buClr>
               <a:buNone/>
             </a:pPr>
             <a:endParaRPr lang="en-NZ" dirty="0" smtClean="0">
@@ -6089,21 +6478,18 @@
             </a:endParaRPr>
           </a:p>
           <a:p>
+            <a:pPr>
+              <a:buClr>
+                <a:srgbClr val="91D7EC"/>
+              </a:buClr>
+            </a:pPr>
             <a:r>
               <a:rPr lang="en-NZ" dirty="0" smtClean="0">
                 <a:solidFill>
                   <a:schemeClr val="bg1"/>
                 </a:solidFill>
               </a:rPr>
-              <a:t>Live </a:t>
-            </a:r>
-            <a:r>
-              <a:rPr lang="en-NZ" dirty="0" smtClean="0">
-                <a:solidFill>
-                  <a:schemeClr val="bg1"/>
-                </a:solidFill>
-              </a:rPr>
-              <a:t>Demo</a:t>
+              <a:t>Live Demo</a:t>
             </a:r>
             <a:endParaRPr lang="en-NZ" dirty="0">
               <a:solidFill>
@@ -6113,6 +6499,36 @@
           </a:p>
         </p:txBody>
       </p:sp>
+      <p:pic>
+        <p:nvPicPr>
+          <p:cNvPr id="4" name="Picture 3"/>
+          <p:cNvPicPr>
+            <a:picLocks noChangeAspect="1"/>
+          </p:cNvPicPr>
+          <p:nvPr/>
+        </p:nvPicPr>
+        <p:blipFill>
+          <a:blip r:embed="rId3">
+            <a:extLst>
+              <a:ext uri="{28A0092B-C50C-407E-A947-70E740481C1C}">
+                <a14:useLocalDpi xmlns:a14="http://schemas.microsoft.com/office/drawing/2010/main" val="0"/>
+              </a:ext>
+            </a:extLst>
+          </a:blip>
+          <a:stretch>
+            <a:fillRect/>
+          </a:stretch>
+        </p:blipFill>
+        <p:spPr>
+          <a:xfrm>
+            <a:off x="4048396" y="4541816"/>
+            <a:ext cx="5095604" cy="2316184"/>
+          </a:xfrm>
+          <a:prstGeom prst="rect">
+            <a:avLst/>
+          </a:prstGeom>
+        </p:spPr>
+      </p:pic>
     </p:spTree>
     <p:extLst>
       <p:ext uri="{BB962C8B-B14F-4D97-AF65-F5344CB8AC3E}">
@@ -6159,13 +6575,113 @@
           <a:lstStyle/>
           <a:p>
             <a:r>
-              <a:rPr lang="en-US" dirty="0" smtClean="0">
-                <a:solidFill>
-                  <a:schemeClr val="bg1"/>
+              <a:rPr lang="en-US" b="1" dirty="0" smtClean="0">
+                <a:solidFill>
+                  <a:srgbClr val="008AD3"/>
                 </a:solidFill>
               </a:rPr>
               <a:t>How it works</a:t>
             </a:r>
+            <a:endParaRPr lang="en-US" b="1" dirty="0">
+              <a:solidFill>
+                <a:srgbClr val="008AD3"/>
+              </a:solidFill>
+            </a:endParaRPr>
+          </a:p>
+        </p:txBody>
+      </p:sp>
+      <p:sp>
+        <p:nvSpPr>
+          <p:cNvPr id="3" name="Content Placeholder 2"/>
+          <p:cNvSpPr>
+            <a:spLocks noGrp="1"/>
+          </p:cNvSpPr>
+          <p:nvPr>
+            <p:ph idx="1"/>
+          </p:nvPr>
+        </p:nvSpPr>
+        <p:spPr/>
+        <p:txBody>
+          <a:bodyPr/>
+          <a:lstStyle/>
+          <a:p>
+            <a:pPr>
+              <a:buClr>
+                <a:srgbClr val="91D7EC"/>
+              </a:buClr>
+            </a:pPr>
+            <a:endParaRPr lang="en-US" dirty="0" smtClean="0">
+              <a:solidFill>
+                <a:schemeClr val="bg1"/>
+              </a:solidFill>
+            </a:endParaRPr>
+          </a:p>
+          <a:p>
+            <a:pPr>
+              <a:buClr>
+                <a:srgbClr val="91D7EC"/>
+              </a:buClr>
+            </a:pPr>
+            <a:r>
+              <a:rPr lang="en-US" dirty="0" smtClean="0">
+                <a:solidFill>
+                  <a:schemeClr val="bg1"/>
+                </a:solidFill>
+              </a:rPr>
+              <a:t>MySQL</a:t>
+            </a:r>
+          </a:p>
+          <a:p>
+            <a:pPr>
+              <a:buClr>
+                <a:srgbClr val="91D7EC"/>
+              </a:buClr>
+            </a:pPr>
+            <a:r>
+              <a:rPr lang="en-US" dirty="0" smtClean="0">
+                <a:solidFill>
+                  <a:schemeClr val="bg1"/>
+                </a:solidFill>
+              </a:rPr>
+              <a:t>PHP</a:t>
+            </a:r>
+          </a:p>
+          <a:p>
+            <a:pPr>
+              <a:buClr>
+                <a:srgbClr val="91D7EC"/>
+              </a:buClr>
+            </a:pPr>
+            <a:r>
+              <a:rPr lang="en-US" dirty="0" smtClean="0">
+                <a:solidFill>
+                  <a:schemeClr val="bg1"/>
+                </a:solidFill>
+              </a:rPr>
+              <a:t>JavaScript</a:t>
+            </a:r>
+          </a:p>
+          <a:p>
+            <a:pPr>
+              <a:buClr>
+                <a:srgbClr val="91D7EC"/>
+              </a:buClr>
+            </a:pPr>
+            <a:r>
+              <a:rPr lang="en-US" dirty="0" smtClean="0">
+                <a:solidFill>
+                  <a:schemeClr val="bg1"/>
+                </a:solidFill>
+              </a:rPr>
+              <a:t>HTML</a:t>
+            </a:r>
+          </a:p>
+          <a:p>
+            <a:pPr>
+              <a:buClr>
+                <a:srgbClr val="91D7EC"/>
+              </a:buClr>
+            </a:pPr>
             <a:endParaRPr lang="en-US" dirty="0">
               <a:solidFill>
                 <a:schemeClr val="bg1"/>
@@ -6174,76 +6690,36 @@
           </a:p>
         </p:txBody>
       </p:sp>
-      <p:sp>
-        <p:nvSpPr>
-          <p:cNvPr id="3" name="Content Placeholder 2"/>
-          <p:cNvSpPr>
-            <a:spLocks noGrp="1"/>
-          </p:cNvSpPr>
-          <p:nvPr>
-            <p:ph idx="1"/>
-          </p:nvPr>
-        </p:nvSpPr>
-        <p:spPr/>
-        <p:txBody>
-          <a:bodyPr/>
-          <a:lstStyle/>
-          <a:p>
-            <a:endParaRPr lang="en-US" dirty="0" smtClean="0">
-              <a:solidFill>
-                <a:schemeClr val="bg1"/>
-              </a:solidFill>
-            </a:endParaRPr>
-          </a:p>
-          <a:p>
-            <a:r>
-              <a:rPr lang="en-US" dirty="0" smtClean="0">
-                <a:solidFill>
-                  <a:schemeClr val="bg1"/>
-                </a:solidFill>
-              </a:rPr>
-              <a:t>MySQL</a:t>
-            </a:r>
-          </a:p>
-          <a:p>
-            <a:r>
-              <a:rPr lang="en-US" dirty="0" smtClean="0">
-                <a:solidFill>
-                  <a:schemeClr val="bg1"/>
-                </a:solidFill>
-              </a:rPr>
-              <a:t>PHP</a:t>
-            </a:r>
-          </a:p>
-          <a:p>
-            <a:r>
-              <a:rPr lang="en-US" dirty="0" smtClean="0">
-                <a:solidFill>
-                  <a:schemeClr val="bg1"/>
-                </a:solidFill>
-              </a:rPr>
-              <a:t>JavaScript</a:t>
-            </a:r>
-          </a:p>
-          <a:p>
-            <a:r>
-              <a:rPr lang="en-US" dirty="0" smtClean="0">
-                <a:solidFill>
-                  <a:schemeClr val="bg1"/>
-                </a:solidFill>
-              </a:rPr>
-              <a:t>HTML</a:t>
-            </a:r>
-          </a:p>
-          <a:p>
-            <a:endParaRPr lang="en-US" dirty="0">
-              <a:solidFill>
-                <a:schemeClr val="bg1"/>
-              </a:solidFill>
-            </a:endParaRPr>
-          </a:p>
-        </p:txBody>
-      </p:sp>
+      <p:pic>
+        <p:nvPicPr>
+          <p:cNvPr id="4" name="Picture 3"/>
+          <p:cNvPicPr>
+            <a:picLocks noChangeAspect="1"/>
+          </p:cNvPicPr>
+          <p:nvPr/>
+        </p:nvPicPr>
+        <p:blipFill>
+          <a:blip r:embed="rId3">
+            <a:extLst>
+              <a:ext uri="{28A0092B-C50C-407E-A947-70E740481C1C}">
+                <a14:useLocalDpi xmlns:a14="http://schemas.microsoft.com/office/drawing/2010/main" val="0"/>
+              </a:ext>
+            </a:extLst>
+          </a:blip>
+          <a:stretch>
+            <a:fillRect/>
+          </a:stretch>
+        </p:blipFill>
+        <p:spPr>
+          <a:xfrm>
+            <a:off x="4048396" y="4541816"/>
+            <a:ext cx="5095604" cy="2316184"/>
+          </a:xfrm>
+          <a:prstGeom prst="rect">
+            <a:avLst/>
+          </a:prstGeom>
+        </p:spPr>
+      </p:pic>
     </p:spTree>
     <p:extLst>
       <p:ext uri="{BB962C8B-B14F-4D97-AF65-F5344CB8AC3E}">
@@ -6290,16 +6766,16 @@
           <a:lstStyle/>
           <a:p>
             <a:r>
-              <a:rPr lang="en-NZ" dirty="0" smtClean="0">
-                <a:solidFill>
-                  <a:schemeClr val="bg1"/>
+              <a:rPr lang="en-NZ" b="1" dirty="0" smtClean="0">
+                <a:solidFill>
+                  <a:srgbClr val="008AD3"/>
                 </a:solidFill>
               </a:rPr>
               <a:t>How it works</a:t>
             </a:r>
-            <a:endParaRPr lang="en-NZ" dirty="0">
+            <a:endParaRPr lang="en-NZ" b="1" dirty="0">
               <a:solidFill>
-                <a:schemeClr val="bg1"/>
+                <a:srgbClr val="008AD3"/>
               </a:solidFill>
             </a:endParaRPr>
           </a:p>
@@ -6320,6 +6796,11 @@
           <a:bodyPr/>
           <a:lstStyle/>
           <a:p>
+            <a:pPr>
+              <a:buClr>
+                <a:srgbClr val="91D7EC"/>
+              </a:buClr>
+            </a:pPr>
             <a:endParaRPr lang="en-NZ" b="1" dirty="0" smtClean="0">
               <a:solidFill>
                 <a:schemeClr val="bg1"/>
@@ -6327,6 +6808,11 @@
             </a:endParaRPr>
           </a:p>
           <a:p>
+            <a:pPr>
+              <a:buClr>
+                <a:srgbClr val="91D7EC"/>
+              </a:buClr>
+            </a:pPr>
             <a:r>
               <a:rPr lang="en-NZ" b="1" dirty="0" smtClean="0">
                 <a:solidFill>
@@ -6337,7 +6823,11 @@
             </a:r>
           </a:p>
           <a:p>
-            <a:pPr lvl="1"/>
+            <a:pPr lvl="1">
+              <a:buClr>
+                <a:srgbClr val="91D7EC"/>
+              </a:buClr>
+            </a:pPr>
             <a:r>
               <a:rPr lang="en-NZ" dirty="0" smtClean="0">
                 <a:solidFill>
@@ -6364,7 +6854,11 @@
             </a:r>
           </a:p>
           <a:p>
-            <a:pPr lvl="1"/>
+            <a:pPr lvl="1">
+              <a:buClr>
+                <a:srgbClr val="91D7EC"/>
+              </a:buClr>
+            </a:pPr>
             <a:r>
               <a:rPr lang="en-NZ" dirty="0" smtClean="0">
                 <a:solidFill>
@@ -6375,7 +6869,11 @@
             </a:r>
           </a:p>
           <a:p>
-            <a:pPr lvl="1"/>
+            <a:pPr lvl="1">
+              <a:buClr>
+                <a:srgbClr val="91D7EC"/>
+              </a:buClr>
+            </a:pPr>
             <a:r>
               <a:rPr lang="en-NZ" dirty="0" smtClean="0">
                 <a:solidFill>
@@ -6387,6 +6885,36 @@
           </a:p>
         </p:txBody>
       </p:sp>
+      <p:pic>
+        <p:nvPicPr>
+          <p:cNvPr id="4" name="Picture 3"/>
+          <p:cNvPicPr>
+            <a:picLocks noChangeAspect="1"/>
+          </p:cNvPicPr>
+          <p:nvPr/>
+        </p:nvPicPr>
+        <p:blipFill>
+          <a:blip r:embed="rId3">
+            <a:extLst>
+              <a:ext uri="{28A0092B-C50C-407E-A947-70E740481C1C}">
+                <a14:useLocalDpi xmlns:a14="http://schemas.microsoft.com/office/drawing/2010/main" val="0"/>
+              </a:ext>
+            </a:extLst>
+          </a:blip>
+          <a:stretch>
+            <a:fillRect/>
+          </a:stretch>
+        </p:blipFill>
+        <p:spPr>
+          <a:xfrm>
+            <a:off x="4048396" y="4541816"/>
+            <a:ext cx="5095604" cy="2316184"/>
+          </a:xfrm>
+          <a:prstGeom prst="rect">
+            <a:avLst/>
+          </a:prstGeom>
+        </p:spPr>
+      </p:pic>
     </p:spTree>
     <p:extLst>
       <p:ext uri="{BB962C8B-B14F-4D97-AF65-F5344CB8AC3E}">

</xml_diff>

<commit_message>
Assigned slides, general tidyup
Assigned a couple of slides, and just tidied up the wording on a few
slides.
</commit_message>
<xml_diff>
--- a/Test/Presentations/Iteration 3.pptx
+++ b/Test/Presentations/Iteration 3.pptx
@@ -805,6 +805,182 @@
 </p:notes>
 </file>
 
+<file path=ppt/notesSlides/notesSlide12.xml><?xml version="1.0" encoding="utf-8"?>
+<p:notes xmlns:a="http://schemas.openxmlformats.org/drawingml/2006/main" xmlns:r="http://schemas.openxmlformats.org/officeDocument/2006/relationships" xmlns:p="http://schemas.openxmlformats.org/presentationml/2006/main">
+  <p:cSld>
+    <p:spTree>
+      <p:nvGrpSpPr>
+        <p:cNvPr id="1" name=""/>
+        <p:cNvGrpSpPr/>
+        <p:nvPr/>
+      </p:nvGrpSpPr>
+      <p:grpSpPr>
+        <a:xfrm>
+          <a:off x="0" y="0"/>
+          <a:ext cx="0" cy="0"/>
+          <a:chOff x="0" y="0"/>
+          <a:chExt cx="0" cy="0"/>
+        </a:xfrm>
+      </p:grpSpPr>
+      <p:sp>
+        <p:nvSpPr>
+          <p:cNvPr id="2" name="Slide Image Placeholder 1"/>
+          <p:cNvSpPr>
+            <a:spLocks noGrp="1" noRot="1" noChangeAspect="1"/>
+          </p:cNvSpPr>
+          <p:nvPr>
+            <p:ph type="sldImg"/>
+          </p:nvPr>
+        </p:nvSpPr>
+        <p:spPr/>
+      </p:sp>
+      <p:sp>
+        <p:nvSpPr>
+          <p:cNvPr id="3" name="Notes Placeholder 2"/>
+          <p:cNvSpPr>
+            <a:spLocks noGrp="1"/>
+          </p:cNvSpPr>
+          <p:nvPr>
+            <p:ph type="body" idx="1"/>
+          </p:nvPr>
+        </p:nvSpPr>
+        <p:spPr/>
+        <p:txBody>
+          <a:bodyPr/>
+          <a:lstStyle/>
+          <a:p>
+            <a:r>
+              <a:rPr lang="en-US" dirty="0" smtClean="0"/>
+              <a:t>Sam</a:t>
+            </a:r>
+            <a:endParaRPr lang="en-US" dirty="0"/>
+          </a:p>
+        </p:txBody>
+      </p:sp>
+      <p:sp>
+        <p:nvSpPr>
+          <p:cNvPr id="4" name="Slide Number Placeholder 3"/>
+          <p:cNvSpPr>
+            <a:spLocks noGrp="1"/>
+          </p:cNvSpPr>
+          <p:nvPr>
+            <p:ph type="sldNum" sz="quarter" idx="10"/>
+          </p:nvPr>
+        </p:nvSpPr>
+        <p:spPr/>
+        <p:txBody>
+          <a:bodyPr/>
+          <a:lstStyle/>
+          <a:p>
+            <a:fld id="{D67E1E7E-CEC6-415A-B3C6-3A55A65B43EF}" type="slidenum">
+              <a:rPr lang="en-US" smtClean="0"/>
+              <a:t>12</a:t>
+            </a:fld>
+            <a:endParaRPr lang="en-US"/>
+          </a:p>
+        </p:txBody>
+      </p:sp>
+    </p:spTree>
+    <p:extLst>
+      <p:ext uri="{BB962C8B-B14F-4D97-AF65-F5344CB8AC3E}">
+        <p14:creationId xmlns:p14="http://schemas.microsoft.com/office/powerpoint/2010/main" val="1651224770"/>
+      </p:ext>
+    </p:extLst>
+  </p:cSld>
+  <p:clrMapOvr>
+    <a:masterClrMapping/>
+  </p:clrMapOvr>
+</p:notes>
+</file>
+
+<file path=ppt/notesSlides/notesSlide13.xml><?xml version="1.0" encoding="utf-8"?>
+<p:notes xmlns:a="http://schemas.openxmlformats.org/drawingml/2006/main" xmlns:r="http://schemas.openxmlformats.org/officeDocument/2006/relationships" xmlns:p="http://schemas.openxmlformats.org/presentationml/2006/main">
+  <p:cSld>
+    <p:spTree>
+      <p:nvGrpSpPr>
+        <p:cNvPr id="1" name=""/>
+        <p:cNvGrpSpPr/>
+        <p:nvPr/>
+      </p:nvGrpSpPr>
+      <p:grpSpPr>
+        <a:xfrm>
+          <a:off x="0" y="0"/>
+          <a:ext cx="0" cy="0"/>
+          <a:chOff x="0" y="0"/>
+          <a:chExt cx="0" cy="0"/>
+        </a:xfrm>
+      </p:grpSpPr>
+      <p:sp>
+        <p:nvSpPr>
+          <p:cNvPr id="2" name="Slide Image Placeholder 1"/>
+          <p:cNvSpPr>
+            <a:spLocks noGrp="1" noRot="1" noChangeAspect="1"/>
+          </p:cNvSpPr>
+          <p:nvPr>
+            <p:ph type="sldImg"/>
+          </p:nvPr>
+        </p:nvSpPr>
+        <p:spPr/>
+      </p:sp>
+      <p:sp>
+        <p:nvSpPr>
+          <p:cNvPr id="3" name="Notes Placeholder 2"/>
+          <p:cNvSpPr>
+            <a:spLocks noGrp="1"/>
+          </p:cNvSpPr>
+          <p:nvPr>
+            <p:ph type="body" idx="1"/>
+          </p:nvPr>
+        </p:nvSpPr>
+        <p:spPr/>
+        <p:txBody>
+          <a:bodyPr/>
+          <a:lstStyle/>
+          <a:p>
+            <a:r>
+              <a:rPr lang="en-US" dirty="0" smtClean="0"/>
+              <a:t>Sam</a:t>
+            </a:r>
+            <a:endParaRPr lang="en-US" dirty="0"/>
+          </a:p>
+        </p:txBody>
+      </p:sp>
+      <p:sp>
+        <p:nvSpPr>
+          <p:cNvPr id="4" name="Slide Number Placeholder 3"/>
+          <p:cNvSpPr>
+            <a:spLocks noGrp="1"/>
+          </p:cNvSpPr>
+          <p:nvPr>
+            <p:ph type="sldNum" sz="quarter" idx="10"/>
+          </p:nvPr>
+        </p:nvSpPr>
+        <p:spPr/>
+        <p:txBody>
+          <a:bodyPr/>
+          <a:lstStyle/>
+          <a:p>
+            <a:fld id="{D67E1E7E-CEC6-415A-B3C6-3A55A65B43EF}" type="slidenum">
+              <a:rPr lang="en-US" smtClean="0"/>
+              <a:t>13</a:t>
+            </a:fld>
+            <a:endParaRPr lang="en-US"/>
+          </a:p>
+        </p:txBody>
+      </p:sp>
+    </p:spTree>
+    <p:extLst>
+      <p:ext uri="{BB962C8B-B14F-4D97-AF65-F5344CB8AC3E}">
+        <p14:creationId xmlns:p14="http://schemas.microsoft.com/office/powerpoint/2010/main" val="1094081984"/>
+      </p:ext>
+    </p:extLst>
+  </p:cSld>
+  <p:clrMapOvr>
+    <a:masterClrMapping/>
+  </p:clrMapOvr>
+</p:notes>
+</file>
+
 <file path=ppt/notesSlides/notesSlide2.xml><?xml version="1.0" encoding="utf-8"?>
 <p:notes xmlns:a="http://schemas.openxmlformats.org/drawingml/2006/main" xmlns:r="http://schemas.openxmlformats.org/officeDocument/2006/relationships" xmlns:p="http://schemas.openxmlformats.org/presentationml/2006/main">
   <p:cSld>
@@ -851,7 +1027,17 @@
           <a:p>
             <a:r>
               <a:rPr lang="en-US" dirty="0" smtClean="0"/>
-              <a:t>This is what</a:t>
+              <a:t>Mason</a:t>
+            </a:r>
+          </a:p>
+          <a:p>
+            <a:r>
+              <a:rPr lang="en-US" dirty="0" smtClean="0"/>
+              <a:t>This </a:t>
+            </a:r>
+            <a:r>
+              <a:rPr lang="en-US" dirty="0" smtClean="0"/>
+              <a:t>is what</a:t>
             </a:r>
             <a:r>
               <a:rPr lang="en-US" baseline="0" dirty="0" smtClean="0"/>
@@ -1356,8 +1542,9 @@
           <a:p>
             <a:r>
               <a:rPr lang="en-US" dirty="0" smtClean="0"/>
-              <a:t>Whoever</a:t>
-            </a:r>
+              <a:t>Mason</a:t>
+            </a:r>
+            <a:endParaRPr lang="en-US" dirty="0" smtClean="0"/>
           </a:p>
           <a:p>
             <a:endParaRPr lang="en-US" dirty="0" smtClean="0"/>
@@ -1575,8 +1762,9 @@
           <a:p>
             <a:r>
               <a:rPr lang="en-US" dirty="0" smtClean="0"/>
-              <a:t>Sam</a:t>
-            </a:r>
+              <a:t>Andrew</a:t>
+            </a:r>
+            <a:endParaRPr lang="en-US" dirty="0" smtClean="0"/>
           </a:p>
           <a:p>
             <a:endParaRPr lang="en-US" dirty="0" smtClean="0"/>
@@ -4881,11 +5069,6 @@
               </a:rPr>
               <a:t>9</a:t>
             </a:r>
-            <a:endParaRPr lang="en-US" b="1" dirty="0">
-              <a:solidFill>
-                <a:schemeClr val="bg1"/>
-              </a:solidFill>
-            </a:endParaRPr>
           </a:p>
         </p:txBody>
       </p:sp>
@@ -5298,7 +5481,7 @@
           <p:nvPr/>
         </p:nvPicPr>
         <p:blipFill>
-          <a:blip r:embed="rId2">
+          <a:blip r:embed="rId3">
             <a:extLst>
               <a:ext uri="{28A0092B-C50C-407E-A947-70E740481C1C}">
                 <a14:useLocalDpi xmlns:a14="http://schemas.microsoft.com/office/drawing/2010/main" val="0"/>
@@ -5472,7 +5655,7 @@
           <p:nvPr/>
         </p:nvPicPr>
         <p:blipFill>
-          <a:blip r:embed="rId2">
+          <a:blip r:embed="rId3">
             <a:extLst>
               <a:ext uri="{28A0092B-C50C-407E-A947-70E740481C1C}">
                 <a14:useLocalDpi xmlns:a14="http://schemas.microsoft.com/office/drawing/2010/main" val="0"/>
@@ -5777,8 +5960,37 @@
                   <a:schemeClr val="bg1"/>
                 </a:solidFill>
               </a:rPr>
-              <a:t>What the end product actually looks like</a:t>
-            </a:r>
+              <a:t>What the </a:t>
+            </a:r>
+            <a:r>
+              <a:rPr lang="en-NZ" dirty="0" smtClean="0">
+                <a:solidFill>
+                  <a:schemeClr val="bg1"/>
+                </a:solidFill>
+              </a:rPr>
+              <a:t>End Product </a:t>
+            </a:r>
+            <a:r>
+              <a:rPr lang="en-NZ" dirty="0" smtClean="0">
+                <a:solidFill>
+                  <a:schemeClr val="bg1"/>
+                </a:solidFill>
+              </a:rPr>
+              <a:t>actually </a:t>
+            </a:r>
+            <a:r>
+              <a:rPr lang="en-NZ" dirty="0" smtClean="0">
+                <a:solidFill>
+                  <a:schemeClr val="bg1"/>
+                </a:solidFill>
+              </a:rPr>
+              <a:t>is</a:t>
+            </a:r>
+            <a:endParaRPr lang="en-NZ" dirty="0" smtClean="0">
+              <a:solidFill>
+                <a:schemeClr val="bg1"/>
+              </a:solidFill>
+            </a:endParaRPr>
           </a:p>
           <a:p>
             <a:pPr>
@@ -5792,8 +6004,21 @@
                   <a:schemeClr val="bg1"/>
                 </a:solidFill>
               </a:rPr>
-              <a:t>Live demonstration</a:t>
-            </a:r>
+              <a:t>Live </a:t>
+            </a:r>
+            <a:r>
+              <a:rPr lang="en-NZ" dirty="0" smtClean="0">
+                <a:solidFill>
+                  <a:schemeClr val="bg1"/>
+                </a:solidFill>
+              </a:rPr>
+              <a:t>Demonstration</a:t>
+            </a:r>
+            <a:endParaRPr lang="en-NZ" dirty="0" smtClean="0">
+              <a:solidFill>
+                <a:schemeClr val="bg1"/>
+              </a:solidFill>
+            </a:endParaRPr>
           </a:p>
           <a:p>
             <a:pPr>
@@ -6333,11 +6558,6 @@
               </a:rPr>
               <a:t>3</a:t>
             </a:r>
-            <a:endParaRPr lang="en-US" b="1" dirty="0">
-              <a:solidFill>
-                <a:schemeClr val="bg1"/>
-              </a:solidFill>
-            </a:endParaRPr>
           </a:p>
         </p:txBody>
       </p:sp>
@@ -6534,11 +6754,6 @@
               </a:rPr>
               <a:t>4</a:t>
             </a:r>
-            <a:endParaRPr lang="en-US" b="1" dirty="0">
-              <a:solidFill>
-                <a:schemeClr val="bg1"/>
-              </a:solidFill>
-            </a:endParaRPr>
           </a:p>
         </p:txBody>
       </p:sp>
@@ -6595,7 +6810,23 @@
                   <a:srgbClr val="008AD3"/>
                 </a:solidFill>
               </a:rPr>
-              <a:t>What we hoped the product would be</a:t>
+              <a:t>What we hoped the </a:t>
+            </a:r>
+            <a:r>
+              <a:rPr lang="en-NZ" b="1" dirty="0" smtClean="0">
+                <a:solidFill>
+                  <a:srgbClr val="008AD3"/>
+                </a:solidFill>
+              </a:rPr>
+              <a:t>Product </a:t>
+            </a:r>
+            <a:r>
+              <a:rPr lang="en-NZ" b="1" dirty="0" smtClean="0">
+                <a:solidFill>
+                  <a:srgbClr val="008AD3"/>
+                </a:solidFill>
+              </a:rPr>
+              <a:t>would be</a:t>
             </a:r>
             <a:endParaRPr lang="en-NZ" b="1" dirty="0">
               <a:solidFill>
@@ -6732,11 +6963,6 @@
               </a:rPr>
               <a:t>5</a:t>
             </a:r>
-            <a:endParaRPr lang="en-US" b="1" dirty="0">
-              <a:solidFill>
-                <a:schemeClr val="bg1"/>
-              </a:solidFill>
-            </a:endParaRPr>
           </a:p>
         </p:txBody>
       </p:sp>
@@ -6791,7 +7017,31 @@
                   <a:srgbClr val="008AD3"/>
                 </a:solidFill>
               </a:rPr>
-              <a:t>The end product</a:t>
+              <a:t>The </a:t>
+            </a:r>
+            <a:r>
+              <a:rPr lang="en-NZ" b="1" dirty="0" smtClean="0">
+                <a:solidFill>
+                  <a:srgbClr val="008AD3"/>
+                </a:solidFill>
+              </a:rPr>
+              <a:t>End </a:t>
+            </a:r>
+            <a:r>
+              <a:rPr lang="en-NZ" b="1" dirty="0">
+                <a:solidFill>
+                  <a:srgbClr val="008AD3"/>
+                </a:solidFill>
+              </a:rPr>
+              <a:t>P</a:t>
+            </a:r>
+            <a:r>
+              <a:rPr lang="en-NZ" b="1" dirty="0" smtClean="0">
+                <a:solidFill>
+                  <a:srgbClr val="008AD3"/>
+                </a:solidFill>
+              </a:rPr>
+              <a:t>roduct</a:t>
             </a:r>
             <a:endParaRPr lang="en-NZ" b="1" dirty="0">
               <a:solidFill>
@@ -7136,11 +7386,6 @@
               </a:rPr>
               <a:t>7</a:t>
             </a:r>
-            <a:endParaRPr lang="en-US" b="1" dirty="0">
-              <a:solidFill>
-                <a:schemeClr val="bg1"/>
-              </a:solidFill>
-            </a:endParaRPr>
           </a:p>
         </p:txBody>
       </p:sp>
@@ -7370,11 +7615,6 @@
               </a:rPr>
               <a:t>8</a:t>
             </a:r>
-            <a:endParaRPr lang="en-US" b="1" dirty="0">
-              <a:solidFill>
-                <a:schemeClr val="bg1"/>
-              </a:solidFill>
-            </a:endParaRPr>
           </a:p>
         </p:txBody>
       </p:sp>

</xml_diff>